<commit_message>
Fix wrong concept for onTouchEvent
</commit_message>
<xml_diff>
--- a/Home/Android/onTouchEvent/onTouchEvent.pptx
+++ b/Home/Android/onTouchEvent/onTouchEvent.pptx
@@ -14,8 +14,8 @@
     <p:sldId id="259" r:id="rId5"/>
     <p:sldId id="260" r:id="rId6"/>
     <p:sldId id="261" r:id="rId7"/>
-    <p:sldId id="262" r:id="rId8"/>
-    <p:sldId id="263" r:id="rId9"/>
+    <p:sldId id="263" r:id="rId8"/>
+    <p:sldId id="262" r:id="rId9"/>
   </p:sldIdLst>
   <p:sldSz cx="12192000" cy="6858000"/>
   <p:notesSz cx="6858000" cy="9144000"/>
@@ -11611,7 +11611,7 @@
           <a:p>
             <a:r>
               <a:rPr kumimoji="1" lang="en-US" altLang="ko-KR" dirty="0" smtClean="0"/>
-              <a:t>Interested View Example</a:t>
+              <a:t>Ignorant View Example</a:t>
             </a:r>
             <a:endParaRPr kumimoji="1" lang="ko-KR" altLang="en-US" dirty="0"/>
           </a:p>
@@ -11775,7 +11775,7 @@
         <p:spPr>
           <a:xfrm>
             <a:off x="9672320" y="2069534"/>
-            <a:ext cx="535724" cy="276999"/>
+            <a:ext cx="680956" cy="276999"/>
           </a:xfrm>
           <a:prstGeom prst="rect">
             <a:avLst/>
@@ -11790,7 +11790,7 @@
           <a:p>
             <a:r>
               <a:rPr kumimoji="1" lang="en-US" altLang="ko-KR" sz="1200" b="1" dirty="0" smtClean="0"/>
-              <a:t>View</a:t>
+              <a:t>Button</a:t>
             </a:r>
             <a:endParaRPr kumimoji="1" lang="ko-KR" altLang="en-US" sz="1200" b="1" dirty="0"/>
           </a:p>
@@ -12119,6 +12119,311 @@
           </a:solidFill>
           <a:ln w="28575">
             <a:solidFill>
+              <a:schemeClr val="tx1"/>
+            </a:solidFill>
+          </a:ln>
+        </p:spPr>
+        <p:style>
+          <a:lnRef idx="2">
+            <a:schemeClr val="accent1">
+              <a:shade val="50000"/>
+            </a:schemeClr>
+          </a:lnRef>
+          <a:fillRef idx="1">
+            <a:schemeClr val="accent1"/>
+          </a:fillRef>
+          <a:effectRef idx="0">
+            <a:schemeClr val="accent1"/>
+          </a:effectRef>
+          <a:fontRef idx="minor">
+            <a:schemeClr val="lt1"/>
+          </a:fontRef>
+        </p:style>
+        <p:txBody>
+          <a:bodyPr lIns="0" tIns="0" rIns="0" bIns="0" rtlCol="0" anchor="ctr"/>
+          <a:lstStyle/>
+          <a:p>
+            <a:pPr algn="ctr"/>
+            <a:r>
+              <a:rPr kumimoji="1" lang="en-US" altLang="ko-KR" sz="1200" dirty="0" err="1" smtClean="0">
+                <a:solidFill>
+                  <a:schemeClr val="tx1"/>
+                </a:solidFill>
+              </a:rPr>
+              <a:t>Activity.onTouchEvent</a:t>
+            </a:r>
+            <a:r>
+              <a:rPr kumimoji="1" lang="en-US" altLang="ko-KR" sz="1200" dirty="0" smtClean="0">
+                <a:solidFill>
+                  <a:schemeClr val="tx1"/>
+                </a:solidFill>
+              </a:rPr>
+              <a:t>()</a:t>
+            </a:r>
+            <a:endParaRPr kumimoji="1" lang="ko-KR" altLang="en-US" sz="1200" dirty="0">
+              <a:solidFill>
+                <a:schemeClr val="tx1"/>
+              </a:solidFill>
+            </a:endParaRPr>
+          </a:p>
+        </p:txBody>
+      </p:sp>
+      <p:sp>
+        <p:nvSpPr>
+          <p:cNvPr id="17" name="모서리가 둥근 직사각형 16"/>
+          <p:cNvSpPr/>
+          <p:nvPr/>
+        </p:nvSpPr>
+        <p:spPr>
+          <a:xfrm>
+            <a:off x="3356502" y="2902638"/>
+            <a:ext cx="2380196" cy="397856"/>
+          </a:xfrm>
+          <a:prstGeom prst="roundRect">
+            <a:avLst/>
+          </a:prstGeom>
+          <a:solidFill>
+            <a:schemeClr val="bg1">
+              <a:lumMod val="95000"/>
+            </a:schemeClr>
+          </a:solidFill>
+          <a:ln w="28575">
+            <a:solidFill>
+              <a:schemeClr val="tx1"/>
+            </a:solidFill>
+          </a:ln>
+        </p:spPr>
+        <p:style>
+          <a:lnRef idx="2">
+            <a:schemeClr val="accent1">
+              <a:shade val="50000"/>
+            </a:schemeClr>
+          </a:lnRef>
+          <a:fillRef idx="1">
+            <a:schemeClr val="accent1"/>
+          </a:fillRef>
+          <a:effectRef idx="0">
+            <a:schemeClr val="accent1"/>
+          </a:effectRef>
+          <a:fontRef idx="minor">
+            <a:schemeClr val="lt1"/>
+          </a:fontRef>
+        </p:style>
+        <p:txBody>
+          <a:bodyPr lIns="0" tIns="0" rIns="0" bIns="0" rtlCol="0" anchor="ctr"/>
+          <a:lstStyle/>
+          <a:p>
+            <a:pPr algn="ctr"/>
+            <a:r>
+              <a:rPr kumimoji="1" lang="en-US" altLang="ko-KR" sz="1200" dirty="0" err="1" smtClean="0">
+                <a:solidFill>
+                  <a:schemeClr val="tx1"/>
+                </a:solidFill>
+              </a:rPr>
+              <a:t>ViewGroup.onTouchEvent</a:t>
+            </a:r>
+            <a:r>
+              <a:rPr kumimoji="1" lang="en-US" altLang="ko-KR" sz="1200" dirty="0" smtClean="0">
+                <a:solidFill>
+                  <a:schemeClr val="tx1"/>
+                </a:solidFill>
+              </a:rPr>
+              <a:t>()</a:t>
+            </a:r>
+          </a:p>
+        </p:txBody>
+      </p:sp>
+      <p:sp>
+        <p:nvSpPr>
+          <p:cNvPr id="18" name="모서리가 둥근 직사각형 17"/>
+          <p:cNvSpPr/>
+          <p:nvPr/>
+        </p:nvSpPr>
+        <p:spPr>
+          <a:xfrm>
+            <a:off x="6276124" y="2902638"/>
+            <a:ext cx="2380196" cy="397856"/>
+          </a:xfrm>
+          <a:prstGeom prst="roundRect">
+            <a:avLst/>
+          </a:prstGeom>
+          <a:solidFill>
+            <a:schemeClr val="bg1">
+              <a:lumMod val="95000"/>
+            </a:schemeClr>
+          </a:solidFill>
+          <a:ln w="28575">
+            <a:solidFill>
+              <a:schemeClr val="tx1"/>
+            </a:solidFill>
+          </a:ln>
+        </p:spPr>
+        <p:style>
+          <a:lnRef idx="2">
+            <a:schemeClr val="accent1">
+              <a:shade val="50000"/>
+            </a:schemeClr>
+          </a:lnRef>
+          <a:fillRef idx="1">
+            <a:schemeClr val="accent1"/>
+          </a:fillRef>
+          <a:effectRef idx="0">
+            <a:schemeClr val="accent1"/>
+          </a:effectRef>
+          <a:fontRef idx="minor">
+            <a:schemeClr val="lt1"/>
+          </a:fontRef>
+        </p:style>
+        <p:txBody>
+          <a:bodyPr lIns="0" tIns="0" rIns="0" bIns="0" rtlCol="0" anchor="ctr"/>
+          <a:lstStyle/>
+          <a:p>
+            <a:pPr algn="ctr"/>
+            <a:r>
+              <a:rPr kumimoji="1" lang="en-US" altLang="ko-KR" sz="1200" dirty="0" err="1" smtClean="0">
+                <a:solidFill>
+                  <a:schemeClr val="tx1"/>
+                </a:solidFill>
+              </a:rPr>
+              <a:t>View.onTouchEvent</a:t>
+            </a:r>
+            <a:r>
+              <a:rPr kumimoji="1" lang="en-US" altLang="ko-KR" sz="1200" dirty="0" smtClean="0">
+                <a:solidFill>
+                  <a:schemeClr val="tx1"/>
+                </a:solidFill>
+              </a:rPr>
+              <a:t>()</a:t>
+            </a:r>
+            <a:endParaRPr kumimoji="1" lang="ko-KR" altLang="en-US" sz="1200" dirty="0">
+              <a:solidFill>
+                <a:schemeClr val="tx1"/>
+              </a:solidFill>
+            </a:endParaRPr>
+          </a:p>
+        </p:txBody>
+      </p:sp>
+      <p:sp>
+        <p:nvSpPr>
+          <p:cNvPr id="25" name="텍스트 상자 24"/>
+          <p:cNvSpPr txBox="1"/>
+          <p:nvPr/>
+        </p:nvSpPr>
+        <p:spPr>
+          <a:xfrm>
+            <a:off x="447040" y="3854920"/>
+            <a:ext cx="1210781" cy="369332"/>
+          </a:xfrm>
+          <a:prstGeom prst="rect">
+            <a:avLst/>
+          </a:prstGeom>
+          <a:noFill/>
+        </p:spPr>
+        <p:txBody>
+          <a:bodyPr wrap="none" rtlCol="0">
+            <a:spAutoFit/>
+          </a:bodyPr>
+          <a:lstStyle/>
+          <a:p>
+            <a:r>
+              <a:rPr kumimoji="1" lang="en-US" altLang="ko-KR" smtClean="0"/>
+              <a:t>Move/Up:</a:t>
+            </a:r>
+            <a:endParaRPr kumimoji="1" lang="ko-KR" altLang="en-US" dirty="0"/>
+          </a:p>
+        </p:txBody>
+      </p:sp>
+      <p:sp>
+        <p:nvSpPr>
+          <p:cNvPr id="26" name="모서리가 둥근 직사각형 25"/>
+          <p:cNvSpPr/>
+          <p:nvPr/>
+        </p:nvSpPr>
+        <p:spPr>
+          <a:xfrm>
+            <a:off x="436880" y="4380822"/>
+            <a:ext cx="2380196" cy="397856"/>
+          </a:xfrm>
+          <a:prstGeom prst="roundRect">
+            <a:avLst/>
+          </a:prstGeom>
+          <a:solidFill>
+            <a:schemeClr val="bg1">
+              <a:lumMod val="95000"/>
+            </a:schemeClr>
+          </a:solidFill>
+          <a:ln w="28575">
+            <a:solidFill>
+              <a:schemeClr val="tx1"/>
+            </a:solidFill>
+          </a:ln>
+        </p:spPr>
+        <p:style>
+          <a:lnRef idx="2">
+            <a:schemeClr val="accent1">
+              <a:shade val="50000"/>
+            </a:schemeClr>
+          </a:lnRef>
+          <a:fillRef idx="1">
+            <a:schemeClr val="accent1"/>
+          </a:fillRef>
+          <a:effectRef idx="0">
+            <a:schemeClr val="accent1"/>
+          </a:effectRef>
+          <a:fontRef idx="minor">
+            <a:schemeClr val="lt1"/>
+          </a:fontRef>
+        </p:style>
+        <p:txBody>
+          <a:bodyPr lIns="0" tIns="0" rIns="0" bIns="0" rtlCol="0" anchor="ctr"/>
+          <a:lstStyle/>
+          <a:p>
+            <a:pPr algn="ctr"/>
+            <a:r>
+              <a:rPr kumimoji="1" lang="en-US" altLang="ko-KR" sz="1200" dirty="0" err="1" smtClean="0">
+                <a:solidFill>
+                  <a:schemeClr val="tx1"/>
+                </a:solidFill>
+              </a:rPr>
+              <a:t>Activity.dispatchTouchEvent</a:t>
+            </a:r>
+            <a:r>
+              <a:rPr kumimoji="1" lang="en-US" altLang="ko-KR" sz="1200" dirty="0" smtClean="0">
+                <a:solidFill>
+                  <a:schemeClr val="tx1"/>
+                </a:solidFill>
+              </a:rPr>
+              <a:t>()</a:t>
+            </a:r>
+            <a:endParaRPr kumimoji="1" lang="ko-KR" altLang="en-US" sz="1200" dirty="0">
+              <a:solidFill>
+                <a:schemeClr val="tx1"/>
+              </a:solidFill>
+            </a:endParaRPr>
+          </a:p>
+        </p:txBody>
+      </p:sp>
+      <p:sp>
+        <p:nvSpPr>
+          <p:cNvPr id="27" name="모서리가 둥근 직사각형 26"/>
+          <p:cNvSpPr/>
+          <p:nvPr/>
+        </p:nvSpPr>
+        <p:spPr>
+          <a:xfrm>
+            <a:off x="3356502" y="4380822"/>
+            <a:ext cx="2380196" cy="397856"/>
+          </a:xfrm>
+          <a:prstGeom prst="roundRect">
+            <a:avLst/>
+          </a:prstGeom>
+          <a:solidFill>
+            <a:schemeClr val="bg1">
+              <a:lumMod val="95000"/>
+            </a:schemeClr>
+          </a:solidFill>
+          <a:ln w="28575">
+            <a:solidFill>
               <a:schemeClr val="bg1">
                 <a:lumMod val="85000"/>
               </a:schemeClr>
@@ -12145,7 +12450,7 @@
           <a:bodyPr lIns="0" tIns="0" rIns="0" bIns="0" rtlCol="0" anchor="ctr"/>
           <a:lstStyle/>
           <a:p>
-            <a:pPr algn="ctr"/>
+            <a:pPr lvl="0" algn="ctr"/>
             <a:r>
               <a:rPr kumimoji="1" lang="en-US" altLang="ko-KR" sz="1200" dirty="0" err="1" smtClean="0">
                 <a:solidFill>
@@ -12154,7 +12459,7 @@
                   </a:schemeClr>
                 </a:solidFill>
               </a:rPr>
-              <a:t>Activity.onTouchEvent</a:t>
+              <a:t>ViewGroup.dispatchTouchEvent</a:t>
             </a:r>
             <a:r>
               <a:rPr kumimoji="1" lang="en-US" altLang="ko-KR" sz="1200" dirty="0" smtClean="0">
@@ -12178,13 +12483,13 @@
       </p:sp>
       <p:sp>
         <p:nvSpPr>
-          <p:cNvPr id="17" name="모서리가 둥근 직사각형 16"/>
+          <p:cNvPr id="28" name="모서리가 둥근 직사각형 27"/>
           <p:cNvSpPr/>
           <p:nvPr/>
         </p:nvSpPr>
         <p:spPr>
           <a:xfrm>
-            <a:off x="3356502" y="2902638"/>
+            <a:off x="6276124" y="4380822"/>
             <a:ext cx="2380196" cy="397856"/>
           </a:xfrm>
           <a:prstGeom prst="roundRect">
@@ -12232,7 +12537,7 @@
                   </a:schemeClr>
                 </a:solidFill>
               </a:rPr>
-              <a:t>ViewGroup.onTouchEvent</a:t>
+              <a:t>View.dispatchTouchEvent</a:t>
             </a:r>
             <a:r>
               <a:rPr kumimoji="1" lang="en-US" altLang="ko-KR" sz="1200" dirty="0" smtClean="0">
@@ -12244,18 +12549,25 @@
               </a:rPr>
               <a:t>()</a:t>
             </a:r>
-          </a:p>
-        </p:txBody>
-      </p:sp>
-      <p:sp>
-        <p:nvSpPr>
-          <p:cNvPr id="18" name="모서리가 둥근 직사각형 17"/>
+            <a:endParaRPr kumimoji="1" lang="ko-KR" altLang="en-US" sz="1200" dirty="0">
+              <a:solidFill>
+                <a:schemeClr val="bg1">
+                  <a:lumMod val="85000"/>
+                </a:schemeClr>
+              </a:solidFill>
+            </a:endParaRPr>
+          </a:p>
+        </p:txBody>
+      </p:sp>
+      <p:sp>
+        <p:nvSpPr>
+          <p:cNvPr id="29" name="모서리가 둥근 직사각형 28"/>
           <p:cNvSpPr/>
           <p:nvPr/>
         </p:nvSpPr>
         <p:spPr>
           <a:xfrm>
-            <a:off x="6276124" y="2902638"/>
+            <a:off x="436880" y="5237987"/>
             <a:ext cx="2380196" cy="397856"/>
           </a:xfrm>
           <a:prstGeom prst="roundRect">
@@ -12299,7 +12611,7 @@
                   <a:schemeClr val="tx1"/>
                 </a:solidFill>
               </a:rPr>
-              <a:t>View.onTouchEvent</a:t>
+              <a:t>Activity.onTouchEvent</a:t>
             </a:r>
             <a:r>
               <a:rPr kumimoji="1" lang="en-US" altLang="ko-KR" sz="1200" dirty="0" smtClean="0">
@@ -12319,253 +12631,13 @@
       </p:sp>
       <p:sp>
         <p:nvSpPr>
-          <p:cNvPr id="25" name="텍스트 상자 24"/>
-          <p:cNvSpPr txBox="1"/>
-          <p:nvPr/>
-        </p:nvSpPr>
-        <p:spPr>
-          <a:xfrm>
-            <a:off x="447040" y="3854920"/>
-            <a:ext cx="1210781" cy="369332"/>
-          </a:xfrm>
-          <a:prstGeom prst="rect">
-            <a:avLst/>
-          </a:prstGeom>
-          <a:noFill/>
-        </p:spPr>
-        <p:txBody>
-          <a:bodyPr wrap="none" rtlCol="0">
-            <a:spAutoFit/>
-          </a:bodyPr>
-          <a:lstStyle/>
-          <a:p>
-            <a:r>
-              <a:rPr kumimoji="1" lang="en-US" altLang="ko-KR" smtClean="0"/>
-              <a:t>Move/Up:</a:t>
-            </a:r>
-            <a:endParaRPr kumimoji="1" lang="ko-KR" altLang="en-US" dirty="0"/>
-          </a:p>
-        </p:txBody>
-      </p:sp>
-      <p:sp>
-        <p:nvSpPr>
-          <p:cNvPr id="26" name="모서리가 둥근 직사각형 25"/>
+          <p:cNvPr id="30" name="모서리가 둥근 직사각형 29"/>
           <p:cNvSpPr/>
           <p:nvPr/>
         </p:nvSpPr>
         <p:spPr>
           <a:xfrm>
-            <a:off x="436880" y="4380822"/>
-            <a:ext cx="2380196" cy="397856"/>
-          </a:xfrm>
-          <a:prstGeom prst="roundRect">
-            <a:avLst/>
-          </a:prstGeom>
-          <a:solidFill>
-            <a:schemeClr val="bg1">
-              <a:lumMod val="95000"/>
-            </a:schemeClr>
-          </a:solidFill>
-          <a:ln w="28575">
-            <a:solidFill>
-              <a:schemeClr val="tx1"/>
-            </a:solidFill>
-          </a:ln>
-        </p:spPr>
-        <p:style>
-          <a:lnRef idx="2">
-            <a:schemeClr val="accent1">
-              <a:shade val="50000"/>
-            </a:schemeClr>
-          </a:lnRef>
-          <a:fillRef idx="1">
-            <a:schemeClr val="accent1"/>
-          </a:fillRef>
-          <a:effectRef idx="0">
-            <a:schemeClr val="accent1"/>
-          </a:effectRef>
-          <a:fontRef idx="minor">
-            <a:schemeClr val="lt1"/>
-          </a:fontRef>
-        </p:style>
-        <p:txBody>
-          <a:bodyPr lIns="0" tIns="0" rIns="0" bIns="0" rtlCol="0" anchor="ctr"/>
-          <a:lstStyle/>
-          <a:p>
-            <a:pPr algn="ctr"/>
-            <a:r>
-              <a:rPr kumimoji="1" lang="en-US" altLang="ko-KR" sz="1200" dirty="0" err="1" smtClean="0">
-                <a:solidFill>
-                  <a:schemeClr val="tx1"/>
-                </a:solidFill>
-              </a:rPr>
-              <a:t>Activity.dispatchTouchEvent</a:t>
-            </a:r>
-            <a:r>
-              <a:rPr kumimoji="1" lang="en-US" altLang="ko-KR" sz="1200" dirty="0" smtClean="0">
-                <a:solidFill>
-                  <a:schemeClr val="tx1"/>
-                </a:solidFill>
-              </a:rPr>
-              <a:t>()</a:t>
-            </a:r>
-            <a:endParaRPr kumimoji="1" lang="ko-KR" altLang="en-US" sz="1200" dirty="0">
-              <a:solidFill>
-                <a:schemeClr val="tx1"/>
-              </a:solidFill>
-            </a:endParaRPr>
-          </a:p>
-        </p:txBody>
-      </p:sp>
-      <p:sp>
-        <p:nvSpPr>
-          <p:cNvPr id="27" name="모서리가 둥근 직사각형 26"/>
-          <p:cNvSpPr/>
-          <p:nvPr/>
-        </p:nvSpPr>
-        <p:spPr>
-          <a:xfrm>
-            <a:off x="3356502" y="4380822"/>
-            <a:ext cx="2380196" cy="397856"/>
-          </a:xfrm>
-          <a:prstGeom prst="roundRect">
-            <a:avLst/>
-          </a:prstGeom>
-          <a:solidFill>
-            <a:schemeClr val="bg1">
-              <a:lumMod val="95000"/>
-            </a:schemeClr>
-          </a:solidFill>
-          <a:ln w="28575">
-            <a:solidFill>
-              <a:schemeClr val="tx1"/>
-            </a:solidFill>
-          </a:ln>
-        </p:spPr>
-        <p:style>
-          <a:lnRef idx="2">
-            <a:schemeClr val="accent1">
-              <a:shade val="50000"/>
-            </a:schemeClr>
-          </a:lnRef>
-          <a:fillRef idx="1">
-            <a:schemeClr val="accent1"/>
-          </a:fillRef>
-          <a:effectRef idx="0">
-            <a:schemeClr val="accent1"/>
-          </a:effectRef>
-          <a:fontRef idx="minor">
-            <a:schemeClr val="lt1"/>
-          </a:fontRef>
-        </p:style>
-        <p:txBody>
-          <a:bodyPr lIns="0" tIns="0" rIns="0" bIns="0" rtlCol="0" anchor="ctr"/>
-          <a:lstStyle/>
-          <a:p>
-            <a:pPr lvl="0" algn="ctr"/>
-            <a:r>
-              <a:rPr kumimoji="1" lang="en-US" altLang="ko-KR" sz="1200" dirty="0" err="1" smtClean="0">
-                <a:solidFill>
-                  <a:schemeClr val="tx1"/>
-                </a:solidFill>
-              </a:rPr>
-              <a:t>ViewGroup.dispatchTouchEvent</a:t>
-            </a:r>
-            <a:r>
-              <a:rPr kumimoji="1" lang="en-US" altLang="ko-KR" sz="1200" dirty="0" smtClean="0">
-                <a:solidFill>
-                  <a:schemeClr val="tx1"/>
-                </a:solidFill>
-              </a:rPr>
-              <a:t>()</a:t>
-            </a:r>
-            <a:endParaRPr kumimoji="1" lang="ko-KR" altLang="en-US" sz="1200" dirty="0">
-              <a:solidFill>
-                <a:schemeClr val="tx1"/>
-              </a:solidFill>
-            </a:endParaRPr>
-          </a:p>
-        </p:txBody>
-      </p:sp>
-      <p:sp>
-        <p:nvSpPr>
-          <p:cNvPr id="28" name="모서리가 둥근 직사각형 27"/>
-          <p:cNvSpPr/>
-          <p:nvPr/>
-        </p:nvSpPr>
-        <p:spPr>
-          <a:xfrm>
-            <a:off x="6276124" y="4380822"/>
-            <a:ext cx="2380196" cy="397856"/>
-          </a:xfrm>
-          <a:prstGeom prst="roundRect">
-            <a:avLst/>
-          </a:prstGeom>
-          <a:solidFill>
-            <a:schemeClr val="bg1">
-              <a:lumMod val="95000"/>
-            </a:schemeClr>
-          </a:solidFill>
-          <a:ln w="28575">
-            <a:solidFill>
-              <a:schemeClr val="tx1"/>
-            </a:solidFill>
-          </a:ln>
-        </p:spPr>
-        <p:style>
-          <a:lnRef idx="2">
-            <a:schemeClr val="accent1">
-              <a:shade val="50000"/>
-            </a:schemeClr>
-          </a:lnRef>
-          <a:fillRef idx="1">
-            <a:schemeClr val="accent1"/>
-          </a:fillRef>
-          <a:effectRef idx="0">
-            <a:schemeClr val="accent1"/>
-          </a:effectRef>
-          <a:fontRef idx="minor">
-            <a:schemeClr val="lt1"/>
-          </a:fontRef>
-        </p:style>
-        <p:txBody>
-          <a:bodyPr lIns="0" tIns="0" rIns="0" bIns="0" rtlCol="0" anchor="ctr"/>
-          <a:lstStyle/>
-          <a:p>
-            <a:pPr algn="ctr"/>
-            <a:r>
-              <a:rPr kumimoji="1" lang="en-US" altLang="ko-KR" sz="1200" dirty="0" err="1" smtClean="0">
-                <a:solidFill>
-                  <a:schemeClr val="tx1"/>
-                </a:solidFill>
-              </a:rPr>
-              <a:t>View.dispatchTouchEvent</a:t>
-            </a:r>
-            <a:r>
-              <a:rPr kumimoji="1" lang="en-US" altLang="ko-KR" sz="1200" dirty="0" smtClean="0">
-                <a:solidFill>
-                  <a:schemeClr val="tx1"/>
-                </a:solidFill>
-              </a:rPr>
-              <a:t>()</a:t>
-            </a:r>
-            <a:endParaRPr kumimoji="1" lang="ko-KR" altLang="en-US" sz="1200" dirty="0">
-              <a:solidFill>
-                <a:schemeClr val="tx1"/>
-              </a:solidFill>
-            </a:endParaRPr>
-          </a:p>
-        </p:txBody>
-      </p:sp>
-      <p:sp>
-        <p:nvSpPr>
-          <p:cNvPr id="29" name="모서리가 둥근 직사각형 28"/>
-          <p:cNvSpPr/>
-          <p:nvPr/>
-        </p:nvSpPr>
-        <p:spPr>
-          <a:xfrm>
-            <a:off x="436880" y="5237987"/>
+            <a:off x="3356502" y="5237987"/>
             <a:ext cx="2380196" cy="397856"/>
           </a:xfrm>
           <a:prstGeom prst="roundRect">
@@ -12613,7 +12685,7 @@
                   </a:schemeClr>
                 </a:solidFill>
               </a:rPr>
-              <a:t>Activity.onTouchEvent</a:t>
+              <a:t>ViewGroup.onTouchEvent</a:t>
             </a:r>
             <a:r>
               <a:rPr kumimoji="1" lang="en-US" altLang="ko-KR" sz="1200" dirty="0" smtClean="0">
@@ -12625,25 +12697,18 @@
               </a:rPr>
               <a:t>()</a:t>
             </a:r>
-            <a:endParaRPr kumimoji="1" lang="ko-KR" altLang="en-US" sz="1200" dirty="0">
-              <a:solidFill>
-                <a:schemeClr val="bg1">
-                  <a:lumMod val="85000"/>
-                </a:schemeClr>
-              </a:solidFill>
-            </a:endParaRPr>
-          </a:p>
-        </p:txBody>
-      </p:sp>
-      <p:sp>
-        <p:nvSpPr>
-          <p:cNvPr id="30" name="모서리가 둥근 직사각형 29"/>
+          </a:p>
+        </p:txBody>
+      </p:sp>
+      <p:sp>
+        <p:nvSpPr>
+          <p:cNvPr id="31" name="모서리가 둥근 직사각형 30"/>
           <p:cNvSpPr/>
           <p:nvPr/>
         </p:nvSpPr>
         <p:spPr>
           <a:xfrm>
-            <a:off x="3356502" y="5237987"/>
+            <a:off x="6276124" y="5237987"/>
             <a:ext cx="2380196" cy="397856"/>
           </a:xfrm>
           <a:prstGeom prst="roundRect">
@@ -12691,7 +12756,7 @@
                   </a:schemeClr>
                 </a:solidFill>
               </a:rPr>
-              <a:t>ViewGroup.onTouchEvent</a:t>
+              <a:t>View.onTouchEvent</a:t>
             </a:r>
             <a:r>
               <a:rPr kumimoji="1" lang="en-US" altLang="ko-KR" sz="1200" dirty="0" smtClean="0">
@@ -12703,74 +12768,11 @@
               </a:rPr>
               <a:t>()</a:t>
             </a:r>
-          </a:p>
-        </p:txBody>
-      </p:sp>
-      <p:sp>
-        <p:nvSpPr>
-          <p:cNvPr id="31" name="모서리가 둥근 직사각형 30"/>
-          <p:cNvSpPr/>
-          <p:nvPr/>
-        </p:nvSpPr>
-        <p:spPr>
-          <a:xfrm>
-            <a:off x="6276124" y="5237987"/>
-            <a:ext cx="2380196" cy="397856"/>
-          </a:xfrm>
-          <a:prstGeom prst="roundRect">
-            <a:avLst/>
-          </a:prstGeom>
-          <a:solidFill>
-            <a:schemeClr val="bg1">
-              <a:lumMod val="95000"/>
-            </a:schemeClr>
-          </a:solidFill>
-          <a:ln w="28575">
-            <a:solidFill>
-              <a:schemeClr val="tx1"/>
-            </a:solidFill>
-          </a:ln>
-        </p:spPr>
-        <p:style>
-          <a:lnRef idx="2">
-            <a:schemeClr val="accent1">
-              <a:shade val="50000"/>
-            </a:schemeClr>
-          </a:lnRef>
-          <a:fillRef idx="1">
-            <a:schemeClr val="accent1"/>
-          </a:fillRef>
-          <a:effectRef idx="0">
-            <a:schemeClr val="accent1"/>
-          </a:effectRef>
-          <a:fontRef idx="minor">
-            <a:schemeClr val="lt1"/>
-          </a:fontRef>
-        </p:style>
-        <p:txBody>
-          <a:bodyPr lIns="0" tIns="0" rIns="0" bIns="0" rtlCol="0" anchor="ctr"/>
-          <a:lstStyle/>
-          <a:p>
-            <a:pPr algn="ctr"/>
-            <a:r>
-              <a:rPr kumimoji="1" lang="en-US" altLang="ko-KR" sz="1200" dirty="0" err="1" smtClean="0">
-                <a:solidFill>
-                  <a:schemeClr val="tx1"/>
-                </a:solidFill>
-              </a:rPr>
-              <a:t>View.onTouchEvent</a:t>
-            </a:r>
-            <a:r>
-              <a:rPr kumimoji="1" lang="en-US" altLang="ko-KR" sz="1200" dirty="0" smtClean="0">
-                <a:solidFill>
-                  <a:schemeClr val="tx1"/>
-                </a:solidFill>
-              </a:rPr>
-              <a:t>()</a:t>
-            </a:r>
             <a:endParaRPr kumimoji="1" lang="ko-KR" altLang="en-US" sz="1200" dirty="0">
               <a:solidFill>
-                <a:schemeClr val="tx1"/>
+                <a:schemeClr val="bg1">
+                  <a:lumMod val="85000"/>
+                </a:schemeClr>
               </a:solidFill>
             </a:endParaRPr>
           </a:p>
@@ -12909,9 +12911,7 @@
           </a:prstGeom>
           <a:ln w="28575">
             <a:solidFill>
-              <a:schemeClr val="bg1">
-                <a:lumMod val="85000"/>
-              </a:schemeClr>
+              <a:schemeClr val="tx1"/>
             </a:solidFill>
             <a:tailEnd type="triangle" w="lg" len="lg"/>
           </a:ln>
@@ -12940,6 +12940,42 @@
         <p:spPr>
           <a:xfrm flipH="1">
             <a:off x="2817076" y="3101566"/>
+            <a:ext cx="539426" cy="0"/>
+          </a:xfrm>
+          <a:prstGeom prst="straightConnector1">
+            <a:avLst/>
+          </a:prstGeom>
+          <a:ln w="28575">
+            <a:solidFill>
+              <a:schemeClr val="tx1"/>
+            </a:solidFill>
+            <a:tailEnd type="triangle" w="lg" len="lg"/>
+          </a:ln>
+        </p:spPr>
+        <p:style>
+          <a:lnRef idx="1">
+            <a:schemeClr val="accent1"/>
+          </a:lnRef>
+          <a:fillRef idx="0">
+            <a:schemeClr val="accent1"/>
+          </a:fillRef>
+          <a:effectRef idx="0">
+            <a:schemeClr val="accent1"/>
+          </a:effectRef>
+          <a:fontRef idx="minor">
+            <a:schemeClr val="tx1"/>
+          </a:fontRef>
+        </p:style>
+      </p:cxnSp>
+      <p:cxnSp>
+        <p:nvCxnSpPr>
+          <p:cNvPr id="45" name="직선 화살표 연결선 44"/>
+          <p:cNvCxnSpPr/>
+          <p:nvPr/>
+        </p:nvCxnSpPr>
+        <p:spPr>
+          <a:xfrm>
+            <a:off x="2817076" y="4581201"/>
             <a:ext cx="539426" cy="0"/>
           </a:xfrm>
           <a:prstGeom prst="straightConnector1">
@@ -12971,13 +13007,13 @@
       </p:cxnSp>
       <p:cxnSp>
         <p:nvCxnSpPr>
-          <p:cNvPr id="45" name="직선 화살표 연결선 44"/>
+          <p:cNvPr id="46" name="직선 화살표 연결선 45"/>
           <p:cNvCxnSpPr/>
           <p:nvPr/>
         </p:nvCxnSpPr>
         <p:spPr>
           <a:xfrm>
-            <a:off x="2817076" y="4581201"/>
+            <a:off x="5736698" y="4581201"/>
             <a:ext cx="539426" cy="0"/>
           </a:xfrm>
           <a:prstGeom prst="straightConnector1">
@@ -12985,82 +13021,9 @@
           </a:prstGeom>
           <a:ln w="28575">
             <a:solidFill>
-              <a:schemeClr val="tx1"/>
-            </a:solidFill>
-            <a:tailEnd type="triangle" w="lg" len="lg"/>
-          </a:ln>
-        </p:spPr>
-        <p:style>
-          <a:lnRef idx="1">
-            <a:schemeClr val="accent1"/>
-          </a:lnRef>
-          <a:fillRef idx="0">
-            <a:schemeClr val="accent1"/>
-          </a:fillRef>
-          <a:effectRef idx="0">
-            <a:schemeClr val="accent1"/>
-          </a:effectRef>
-          <a:fontRef idx="minor">
-            <a:schemeClr val="tx1"/>
-          </a:fontRef>
-        </p:style>
-      </p:cxnSp>
-      <p:cxnSp>
-        <p:nvCxnSpPr>
-          <p:cNvPr id="46" name="직선 화살표 연결선 45"/>
-          <p:cNvCxnSpPr/>
-          <p:nvPr/>
-        </p:nvCxnSpPr>
-        <p:spPr>
-          <a:xfrm>
-            <a:off x="5736698" y="4581201"/>
-            <a:ext cx="539426" cy="0"/>
-          </a:xfrm>
-          <a:prstGeom prst="straightConnector1">
-            <a:avLst/>
-          </a:prstGeom>
-          <a:ln w="28575">
-            <a:solidFill>
-              <a:schemeClr val="tx1"/>
-            </a:solidFill>
-            <a:tailEnd type="triangle" w="lg" len="lg"/>
-          </a:ln>
-        </p:spPr>
-        <p:style>
-          <a:lnRef idx="1">
-            <a:schemeClr val="accent1"/>
-          </a:lnRef>
-          <a:fillRef idx="0">
-            <a:schemeClr val="accent1"/>
-          </a:fillRef>
-          <a:effectRef idx="0">
-            <a:schemeClr val="accent1"/>
-          </a:effectRef>
-          <a:fontRef idx="minor">
-            <a:schemeClr val="tx1"/>
-          </a:fontRef>
-        </p:style>
-      </p:cxnSp>
-      <p:cxnSp>
-        <p:nvCxnSpPr>
-          <p:cNvPr id="47" name="직선 화살표 연결선 46"/>
-          <p:cNvCxnSpPr>
-            <a:stCxn id="28" idx="2"/>
-            <a:endCxn id="31" idx="0"/>
-          </p:cNvCxnSpPr>
-          <p:nvPr/>
-        </p:nvCxnSpPr>
-        <p:spPr>
-          <a:xfrm>
-            <a:off x="7466222" y="4778678"/>
-            <a:ext cx="0" cy="459309"/>
-          </a:xfrm>
-          <a:prstGeom prst="straightConnector1">
-            <a:avLst/>
-          </a:prstGeom>
-          <a:ln w="28575">
-            <a:solidFill>
-              <a:schemeClr val="tx1"/>
+              <a:schemeClr val="bg1">
+                <a:lumMod val="85000"/>
+              </a:schemeClr>
             </a:solidFill>
             <a:tailEnd type="triangle" w="lg" len="lg"/>
           </a:ln>
@@ -13159,10 +13122,46 @@
           </a:fontRef>
         </p:style>
       </p:cxnSp>
+      <p:cxnSp>
+        <p:nvCxnSpPr>
+          <p:cNvPr id="36" name="직선 화살표 연결선 35"/>
+          <p:cNvCxnSpPr/>
+          <p:nvPr/>
+        </p:nvCxnSpPr>
+        <p:spPr>
+          <a:xfrm>
+            <a:off x="1585323" y="4778678"/>
+            <a:ext cx="0" cy="459309"/>
+          </a:xfrm>
+          <a:prstGeom prst="straightConnector1">
+            <a:avLst/>
+          </a:prstGeom>
+          <a:ln w="28575">
+            <a:solidFill>
+              <a:schemeClr val="tx1"/>
+            </a:solidFill>
+            <a:tailEnd type="triangle" w="lg" len="lg"/>
+          </a:ln>
+        </p:spPr>
+        <p:style>
+          <a:lnRef idx="1">
+            <a:schemeClr val="accent1"/>
+          </a:lnRef>
+          <a:fillRef idx="0">
+            <a:schemeClr val="accent1"/>
+          </a:fillRef>
+          <a:effectRef idx="0">
+            <a:schemeClr val="accent1"/>
+          </a:effectRef>
+          <a:fontRef idx="minor">
+            <a:schemeClr val="tx1"/>
+          </a:fontRef>
+        </p:style>
+      </p:cxnSp>
     </p:spTree>
     <p:extLst>
       <p:ext uri="{BB962C8B-B14F-4D97-AF65-F5344CB8AC3E}">
-        <p14:creationId xmlns:p14="http://schemas.microsoft.com/office/powerpoint/2010/main" val="828951870"/>
+        <p14:creationId xmlns:p14="http://schemas.microsoft.com/office/powerpoint/2010/main" val="561626025"/>
       </p:ext>
     </p:extLst>
   </p:cSld>
@@ -13206,7 +13205,7 @@
           <a:p>
             <a:r>
               <a:rPr kumimoji="1" lang="en-US" altLang="ko-KR" dirty="0" smtClean="0"/>
-              <a:t>Ignorant View Example</a:t>
+              <a:t>Interested View Example</a:t>
             </a:r>
             <a:endParaRPr kumimoji="1" lang="ko-KR" altLang="en-US" dirty="0"/>
           </a:p>
@@ -13370,7 +13369,7 @@
         <p:spPr>
           <a:xfrm>
             <a:off x="9672320" y="2069534"/>
-            <a:ext cx="680956" cy="276999"/>
+            <a:ext cx="535724" cy="276999"/>
           </a:xfrm>
           <a:prstGeom prst="rect">
             <a:avLst/>
@@ -13385,7 +13384,7 @@
           <a:p>
             <a:r>
               <a:rPr kumimoji="1" lang="en-US" altLang="ko-KR" sz="1200" b="1" dirty="0" smtClean="0"/>
-              <a:t>Button</a:t>
+              <a:t>View</a:t>
             </a:r>
             <a:endParaRPr kumimoji="1" lang="ko-KR" altLang="en-US" sz="1200" b="1" dirty="0"/>
           </a:p>
@@ -13714,6 +13713,155 @@
           </a:solidFill>
           <a:ln w="28575">
             <a:solidFill>
+              <a:schemeClr val="bg1">
+                <a:lumMod val="85000"/>
+              </a:schemeClr>
+            </a:solidFill>
+          </a:ln>
+        </p:spPr>
+        <p:style>
+          <a:lnRef idx="2">
+            <a:schemeClr val="accent1">
+              <a:shade val="50000"/>
+            </a:schemeClr>
+          </a:lnRef>
+          <a:fillRef idx="1">
+            <a:schemeClr val="accent1"/>
+          </a:fillRef>
+          <a:effectRef idx="0">
+            <a:schemeClr val="accent1"/>
+          </a:effectRef>
+          <a:fontRef idx="minor">
+            <a:schemeClr val="lt1"/>
+          </a:fontRef>
+        </p:style>
+        <p:txBody>
+          <a:bodyPr lIns="0" tIns="0" rIns="0" bIns="0" rtlCol="0" anchor="ctr"/>
+          <a:lstStyle/>
+          <a:p>
+            <a:pPr algn="ctr"/>
+            <a:r>
+              <a:rPr kumimoji="1" lang="en-US" altLang="ko-KR" sz="1200" dirty="0" err="1" smtClean="0">
+                <a:solidFill>
+                  <a:schemeClr val="bg1">
+                    <a:lumMod val="85000"/>
+                  </a:schemeClr>
+                </a:solidFill>
+              </a:rPr>
+              <a:t>Activity.onTouchEvent</a:t>
+            </a:r>
+            <a:r>
+              <a:rPr kumimoji="1" lang="en-US" altLang="ko-KR" sz="1200" dirty="0" smtClean="0">
+                <a:solidFill>
+                  <a:schemeClr val="bg1">
+                    <a:lumMod val="85000"/>
+                  </a:schemeClr>
+                </a:solidFill>
+              </a:rPr>
+              <a:t>()</a:t>
+            </a:r>
+            <a:endParaRPr kumimoji="1" lang="ko-KR" altLang="en-US" sz="1200" dirty="0">
+              <a:solidFill>
+                <a:schemeClr val="bg1">
+                  <a:lumMod val="85000"/>
+                </a:schemeClr>
+              </a:solidFill>
+            </a:endParaRPr>
+          </a:p>
+        </p:txBody>
+      </p:sp>
+      <p:sp>
+        <p:nvSpPr>
+          <p:cNvPr id="17" name="모서리가 둥근 직사각형 16"/>
+          <p:cNvSpPr/>
+          <p:nvPr/>
+        </p:nvSpPr>
+        <p:spPr>
+          <a:xfrm>
+            <a:off x="3356502" y="2902638"/>
+            <a:ext cx="2380196" cy="397856"/>
+          </a:xfrm>
+          <a:prstGeom prst="roundRect">
+            <a:avLst/>
+          </a:prstGeom>
+          <a:solidFill>
+            <a:schemeClr val="bg1">
+              <a:lumMod val="95000"/>
+            </a:schemeClr>
+          </a:solidFill>
+          <a:ln w="28575">
+            <a:solidFill>
+              <a:schemeClr val="bg1">
+                <a:lumMod val="85000"/>
+              </a:schemeClr>
+            </a:solidFill>
+          </a:ln>
+        </p:spPr>
+        <p:style>
+          <a:lnRef idx="2">
+            <a:schemeClr val="accent1">
+              <a:shade val="50000"/>
+            </a:schemeClr>
+          </a:lnRef>
+          <a:fillRef idx="1">
+            <a:schemeClr val="accent1"/>
+          </a:fillRef>
+          <a:effectRef idx="0">
+            <a:schemeClr val="accent1"/>
+          </a:effectRef>
+          <a:fontRef idx="minor">
+            <a:schemeClr val="lt1"/>
+          </a:fontRef>
+        </p:style>
+        <p:txBody>
+          <a:bodyPr lIns="0" tIns="0" rIns="0" bIns="0" rtlCol="0" anchor="ctr"/>
+          <a:lstStyle/>
+          <a:p>
+            <a:pPr algn="ctr"/>
+            <a:r>
+              <a:rPr kumimoji="1" lang="en-US" altLang="ko-KR" sz="1200" dirty="0" err="1" smtClean="0">
+                <a:solidFill>
+                  <a:schemeClr val="bg1">
+                    <a:lumMod val="85000"/>
+                  </a:schemeClr>
+                </a:solidFill>
+              </a:rPr>
+              <a:t>ViewGroup.onTouchEvent</a:t>
+            </a:r>
+            <a:r>
+              <a:rPr kumimoji="1" lang="en-US" altLang="ko-KR" sz="1200" dirty="0" smtClean="0">
+                <a:solidFill>
+                  <a:schemeClr val="bg1">
+                    <a:lumMod val="85000"/>
+                  </a:schemeClr>
+                </a:solidFill>
+              </a:rPr>
+              <a:t>()</a:t>
+            </a:r>
+          </a:p>
+        </p:txBody>
+      </p:sp>
+      <p:sp>
+        <p:nvSpPr>
+          <p:cNvPr id="18" name="모서리가 둥근 직사각형 17"/>
+          <p:cNvSpPr/>
+          <p:nvPr/>
+        </p:nvSpPr>
+        <p:spPr>
+          <a:xfrm>
+            <a:off x="6276124" y="2902638"/>
+            <a:ext cx="2380196" cy="397856"/>
+          </a:xfrm>
+          <a:prstGeom prst="roundRect">
+            <a:avLst/>
+          </a:prstGeom>
+          <a:solidFill>
+            <a:schemeClr val="bg1">
+              <a:lumMod val="95000"/>
+            </a:schemeClr>
+          </a:solidFill>
+          <a:ln w="28575">
+            <a:solidFill>
               <a:schemeClr val="tx1"/>
             </a:solidFill>
           </a:ln>
@@ -13745,7 +13893,7 @@
                   <a:schemeClr val="tx1"/>
                 </a:solidFill>
               </a:rPr>
-              <a:t>Activity.onTouchEvent</a:t>
+              <a:t>View.onTouchEvent</a:t>
             </a:r>
             <a:r>
               <a:rPr kumimoji="1" lang="en-US" altLang="ko-KR" sz="1200" dirty="0" smtClean="0">
@@ -13765,13 +13913,43 @@
       </p:sp>
       <p:sp>
         <p:nvSpPr>
-          <p:cNvPr id="17" name="모서리가 둥근 직사각형 16"/>
+          <p:cNvPr id="25" name="텍스트 상자 24"/>
+          <p:cNvSpPr txBox="1"/>
+          <p:nvPr/>
+        </p:nvSpPr>
+        <p:spPr>
+          <a:xfrm>
+            <a:off x="447040" y="3854920"/>
+            <a:ext cx="1210781" cy="369332"/>
+          </a:xfrm>
+          <a:prstGeom prst="rect">
+            <a:avLst/>
+          </a:prstGeom>
+          <a:noFill/>
+        </p:spPr>
+        <p:txBody>
+          <a:bodyPr wrap="none" rtlCol="0">
+            <a:spAutoFit/>
+          </a:bodyPr>
+          <a:lstStyle/>
+          <a:p>
+            <a:r>
+              <a:rPr kumimoji="1" lang="en-US" altLang="ko-KR" smtClean="0"/>
+              <a:t>Move/Up:</a:t>
+            </a:r>
+            <a:endParaRPr kumimoji="1" lang="ko-KR" altLang="en-US" dirty="0"/>
+          </a:p>
+        </p:txBody>
+      </p:sp>
+      <p:sp>
+        <p:nvSpPr>
+          <p:cNvPr id="26" name="모서리가 둥근 직사각형 25"/>
           <p:cNvSpPr/>
           <p:nvPr/>
         </p:nvSpPr>
         <p:spPr>
           <a:xfrm>
-            <a:off x="3356502" y="2902638"/>
+            <a:off x="436880" y="4380822"/>
             <a:ext cx="2380196" cy="397856"/>
           </a:xfrm>
           <a:prstGeom prst="roundRect">
@@ -13815,7 +13993,7 @@
                   <a:schemeClr val="tx1"/>
                 </a:solidFill>
               </a:rPr>
-              <a:t>ViewGroup.onTouchEvent</a:t>
+              <a:t>Activity.dispatchTouchEvent</a:t>
             </a:r>
             <a:r>
               <a:rPr kumimoji="1" lang="en-US" altLang="ko-KR" sz="1200" dirty="0" smtClean="0">
@@ -13825,18 +14003,23 @@
               </a:rPr>
               <a:t>()</a:t>
             </a:r>
-          </a:p>
-        </p:txBody>
-      </p:sp>
-      <p:sp>
-        <p:nvSpPr>
-          <p:cNvPr id="18" name="모서리가 둥근 직사각형 17"/>
+            <a:endParaRPr kumimoji="1" lang="ko-KR" altLang="en-US" sz="1200" dirty="0">
+              <a:solidFill>
+                <a:schemeClr val="tx1"/>
+              </a:solidFill>
+            </a:endParaRPr>
+          </a:p>
+        </p:txBody>
+      </p:sp>
+      <p:sp>
+        <p:nvSpPr>
+          <p:cNvPr id="27" name="모서리가 둥근 직사각형 26"/>
           <p:cNvSpPr/>
           <p:nvPr/>
         </p:nvSpPr>
         <p:spPr>
           <a:xfrm>
-            <a:off x="6276124" y="2902638"/>
+            <a:off x="3356502" y="4380822"/>
             <a:ext cx="2380196" cy="397856"/>
           </a:xfrm>
           <a:prstGeom prst="roundRect">
@@ -13873,14 +14056,14 @@
           <a:bodyPr lIns="0" tIns="0" rIns="0" bIns="0" rtlCol="0" anchor="ctr"/>
           <a:lstStyle/>
           <a:p>
-            <a:pPr algn="ctr"/>
+            <a:pPr lvl="0" algn="ctr"/>
             <a:r>
               <a:rPr kumimoji="1" lang="en-US" altLang="ko-KR" sz="1200" dirty="0" err="1" smtClean="0">
                 <a:solidFill>
                   <a:schemeClr val="tx1"/>
                 </a:solidFill>
               </a:rPr>
-              <a:t>View.onTouchEvent</a:t>
+              <a:t>ViewGroup.dispatchTouchEvent</a:t>
             </a:r>
             <a:r>
               <a:rPr kumimoji="1" lang="en-US" altLang="ko-KR" sz="1200" dirty="0" smtClean="0">
@@ -13900,43 +14083,13 @@
       </p:sp>
       <p:sp>
         <p:nvSpPr>
-          <p:cNvPr id="25" name="텍스트 상자 24"/>
-          <p:cNvSpPr txBox="1"/>
-          <p:nvPr/>
-        </p:nvSpPr>
-        <p:spPr>
-          <a:xfrm>
-            <a:off x="447040" y="3854920"/>
-            <a:ext cx="1210781" cy="369332"/>
-          </a:xfrm>
-          <a:prstGeom prst="rect">
-            <a:avLst/>
-          </a:prstGeom>
-          <a:noFill/>
-        </p:spPr>
-        <p:txBody>
-          <a:bodyPr wrap="none" rtlCol="0">
-            <a:spAutoFit/>
-          </a:bodyPr>
-          <a:lstStyle/>
-          <a:p>
-            <a:r>
-              <a:rPr kumimoji="1" lang="en-US" altLang="ko-KR" smtClean="0"/>
-              <a:t>Move/Up:</a:t>
-            </a:r>
-            <a:endParaRPr kumimoji="1" lang="ko-KR" altLang="en-US" dirty="0"/>
-          </a:p>
-        </p:txBody>
-      </p:sp>
-      <p:sp>
-        <p:nvSpPr>
-          <p:cNvPr id="26" name="모서리가 둥근 직사각형 25"/>
+          <p:cNvPr id="28" name="모서리가 둥근 직사각형 27"/>
           <p:cNvSpPr/>
           <p:nvPr/>
         </p:nvSpPr>
         <p:spPr>
           <a:xfrm>
-            <a:off x="436880" y="4380822"/>
+            <a:off x="6276124" y="4380822"/>
             <a:ext cx="2380196" cy="397856"/>
           </a:xfrm>
           <a:prstGeom prst="roundRect">
@@ -13980,7 +14133,7 @@
                   <a:schemeClr val="tx1"/>
                 </a:solidFill>
               </a:rPr>
-              <a:t>Activity.dispatchTouchEvent</a:t>
+              <a:t>View.dispatchTouchEvent</a:t>
             </a:r>
             <a:r>
               <a:rPr kumimoji="1" lang="en-US" altLang="ko-KR" sz="1200" dirty="0" smtClean="0">
@@ -14000,13 +14153,13 @@
       </p:sp>
       <p:sp>
         <p:nvSpPr>
-          <p:cNvPr id="27" name="모서리가 둥근 직사각형 26"/>
+          <p:cNvPr id="29" name="모서리가 둥근 직사각형 28"/>
           <p:cNvSpPr/>
           <p:nvPr/>
         </p:nvSpPr>
         <p:spPr>
           <a:xfrm>
-            <a:off x="3356502" y="4380822"/>
+            <a:off x="436880" y="5237987"/>
             <a:ext cx="2380196" cy="397856"/>
           </a:xfrm>
           <a:prstGeom prst="roundRect">
@@ -14019,7 +14172,9 @@
           </a:solidFill>
           <a:ln w="28575">
             <a:solidFill>
-              <a:schemeClr val="tx1"/>
+              <a:schemeClr val="bg1">
+                <a:lumMod val="85000"/>
+              </a:schemeClr>
             </a:solidFill>
           </a:ln>
         </p:spPr>
@@ -14043,26 +14198,32 @@
           <a:bodyPr lIns="0" tIns="0" rIns="0" bIns="0" rtlCol="0" anchor="ctr"/>
           <a:lstStyle/>
           <a:p>
-            <a:pPr lvl="0" algn="ctr"/>
+            <a:pPr algn="ctr"/>
             <a:r>
               <a:rPr kumimoji="1" lang="en-US" altLang="ko-KR" sz="1200" dirty="0" err="1" smtClean="0">
                 <a:solidFill>
-                  <a:prstClr val="black"/>
+                  <a:schemeClr val="bg1">
+                    <a:lumMod val="85000"/>
+                  </a:schemeClr>
                 </a:solidFill>
               </a:rPr>
-              <a:t>ViewGroup.dispatchTouchEvent</a:t>
+              <a:t>Activity.onTouchEvent</a:t>
             </a:r>
             <a:r>
               <a:rPr kumimoji="1" lang="en-US" altLang="ko-KR" sz="1200" dirty="0" smtClean="0">
                 <a:solidFill>
-                  <a:prstClr val="black"/>
+                  <a:schemeClr val="bg1">
+                    <a:lumMod val="85000"/>
+                  </a:schemeClr>
                 </a:solidFill>
               </a:rPr>
               <a:t>()</a:t>
             </a:r>
             <a:endParaRPr kumimoji="1" lang="ko-KR" altLang="en-US" sz="1200" dirty="0">
               <a:solidFill>
-                <a:prstClr val="black"/>
+                <a:schemeClr val="bg1">
+                  <a:lumMod val="85000"/>
+                </a:schemeClr>
               </a:solidFill>
             </a:endParaRPr>
           </a:p>
@@ -14070,13 +14231,13 @@
       </p:sp>
       <p:sp>
         <p:nvSpPr>
-          <p:cNvPr id="28" name="모서리가 둥근 직사각형 27"/>
+          <p:cNvPr id="30" name="모서리가 둥근 직사각형 29"/>
           <p:cNvSpPr/>
           <p:nvPr/>
         </p:nvSpPr>
         <p:spPr>
           <a:xfrm>
-            <a:off x="6276124" y="4380822"/>
+            <a:off x="3356502" y="5237987"/>
             <a:ext cx="2380196" cy="397856"/>
           </a:xfrm>
           <a:prstGeom prst="roundRect">
@@ -14089,7 +14250,9 @@
           </a:solidFill>
           <a:ln w="28575">
             <a:solidFill>
-              <a:schemeClr val="tx1"/>
+              <a:schemeClr val="bg1">
+                <a:lumMod val="85000"/>
+              </a:schemeClr>
             </a:solidFill>
           </a:ln>
         </p:spPr>
@@ -14117,147 +14280,9 @@
             <a:r>
               <a:rPr kumimoji="1" lang="en-US" altLang="ko-KR" sz="1200" dirty="0" err="1" smtClean="0">
                 <a:solidFill>
-                  <a:schemeClr val="tx1"/>
-                </a:solidFill>
-              </a:rPr>
-              <a:t>View.dispatchTouchEvent</a:t>
-            </a:r>
-            <a:r>
-              <a:rPr kumimoji="1" lang="en-US" altLang="ko-KR" sz="1200" dirty="0" smtClean="0">
-                <a:solidFill>
-                  <a:schemeClr val="tx1"/>
-                </a:solidFill>
-              </a:rPr>
-              <a:t>()</a:t>
-            </a:r>
-            <a:endParaRPr kumimoji="1" lang="ko-KR" altLang="en-US" sz="1200" dirty="0">
-              <a:solidFill>
-                <a:schemeClr val="tx1"/>
-              </a:solidFill>
-            </a:endParaRPr>
-          </a:p>
-        </p:txBody>
-      </p:sp>
-      <p:sp>
-        <p:nvSpPr>
-          <p:cNvPr id="29" name="모서리가 둥근 직사각형 28"/>
-          <p:cNvSpPr/>
-          <p:nvPr/>
-        </p:nvSpPr>
-        <p:spPr>
-          <a:xfrm>
-            <a:off x="436880" y="5237987"/>
-            <a:ext cx="2380196" cy="397856"/>
-          </a:xfrm>
-          <a:prstGeom prst="roundRect">
-            <a:avLst/>
-          </a:prstGeom>
-          <a:solidFill>
-            <a:schemeClr val="bg1">
-              <a:lumMod val="95000"/>
-            </a:schemeClr>
-          </a:solidFill>
-          <a:ln w="28575">
-            <a:solidFill>
-              <a:schemeClr val="tx1"/>
-            </a:solidFill>
-          </a:ln>
-        </p:spPr>
-        <p:style>
-          <a:lnRef idx="2">
-            <a:schemeClr val="accent1">
-              <a:shade val="50000"/>
-            </a:schemeClr>
-          </a:lnRef>
-          <a:fillRef idx="1">
-            <a:schemeClr val="accent1"/>
-          </a:fillRef>
-          <a:effectRef idx="0">
-            <a:schemeClr val="accent1"/>
-          </a:effectRef>
-          <a:fontRef idx="minor">
-            <a:schemeClr val="lt1"/>
-          </a:fontRef>
-        </p:style>
-        <p:txBody>
-          <a:bodyPr lIns="0" tIns="0" rIns="0" bIns="0" rtlCol="0" anchor="ctr"/>
-          <a:lstStyle/>
-          <a:p>
-            <a:pPr algn="ctr"/>
-            <a:r>
-              <a:rPr kumimoji="1" lang="en-US" altLang="ko-KR" sz="1200" dirty="0" err="1" smtClean="0">
-                <a:solidFill>
-                  <a:schemeClr val="tx1"/>
-                </a:solidFill>
-              </a:rPr>
-              <a:t>Activity.onTouchEvent</a:t>
-            </a:r>
-            <a:r>
-              <a:rPr kumimoji="1" lang="en-US" altLang="ko-KR" sz="1200" dirty="0" smtClean="0">
-                <a:solidFill>
-                  <a:schemeClr val="tx1"/>
-                </a:solidFill>
-              </a:rPr>
-              <a:t>()</a:t>
-            </a:r>
-            <a:endParaRPr kumimoji="1" lang="ko-KR" altLang="en-US" sz="1200" dirty="0">
-              <a:solidFill>
-                <a:schemeClr val="tx1"/>
-              </a:solidFill>
-            </a:endParaRPr>
-          </a:p>
-        </p:txBody>
-      </p:sp>
-      <p:sp>
-        <p:nvSpPr>
-          <p:cNvPr id="30" name="모서리가 둥근 직사각형 29"/>
-          <p:cNvSpPr/>
-          <p:nvPr/>
-        </p:nvSpPr>
-        <p:spPr>
-          <a:xfrm>
-            <a:off x="3356502" y="5237987"/>
-            <a:ext cx="2380196" cy="397856"/>
-          </a:xfrm>
-          <a:prstGeom prst="roundRect">
-            <a:avLst/>
-          </a:prstGeom>
-          <a:solidFill>
-            <a:schemeClr val="bg1">
-              <a:lumMod val="95000"/>
-            </a:schemeClr>
-          </a:solidFill>
-          <a:ln w="28575">
-            <a:solidFill>
-              <a:schemeClr val="tx1"/>
-            </a:solidFill>
-          </a:ln>
-        </p:spPr>
-        <p:style>
-          <a:lnRef idx="2">
-            <a:schemeClr val="accent1">
-              <a:shade val="50000"/>
-            </a:schemeClr>
-          </a:lnRef>
-          <a:fillRef idx="1">
-            <a:schemeClr val="accent1"/>
-          </a:fillRef>
-          <a:effectRef idx="0">
-            <a:schemeClr val="accent1"/>
-          </a:effectRef>
-          <a:fontRef idx="minor">
-            <a:schemeClr val="lt1"/>
-          </a:fontRef>
-        </p:style>
-        <p:txBody>
-          <a:bodyPr lIns="0" tIns="0" rIns="0" bIns="0" rtlCol="0" anchor="ctr"/>
-          <a:lstStyle/>
-          <a:p>
-            <a:pPr algn="ctr"/>
-            <a:r>
-              <a:rPr kumimoji="1" lang="en-US" altLang="ko-KR" sz="1200" dirty="0" err="1" smtClean="0">
-                <a:solidFill>
-                  <a:schemeClr val="tx1"/>
+                  <a:schemeClr val="bg1">
+                    <a:lumMod val="85000"/>
+                  </a:schemeClr>
                 </a:solidFill>
               </a:rPr>
               <a:t>ViewGroup.onTouchEvent</a:t>
@@ -14265,7 +14290,9 @@
             <a:r>
               <a:rPr kumimoji="1" lang="en-US" altLang="ko-KR" sz="1200" dirty="0" smtClean="0">
                 <a:solidFill>
-                  <a:schemeClr val="tx1"/>
+                  <a:schemeClr val="bg1">
+                    <a:lumMod val="85000"/>
+                  </a:schemeClr>
                 </a:solidFill>
               </a:rPr>
               <a:t>()</a:t>
@@ -14476,7 +14503,9 @@
           </a:prstGeom>
           <a:ln w="28575">
             <a:solidFill>
-              <a:schemeClr val="tx1"/>
+              <a:schemeClr val="bg1">
+                <a:lumMod val="85000"/>
+              </a:schemeClr>
             </a:solidFill>
             <a:tailEnd type="triangle" w="lg" len="lg"/>
           </a:ln>
@@ -14512,7 +14541,9 @@
           </a:prstGeom>
           <a:ln w="28575">
             <a:solidFill>
-              <a:schemeClr val="tx1"/>
+              <a:schemeClr val="bg1">
+                <a:lumMod val="85000"/>
+              </a:schemeClr>
             </a:solidFill>
             <a:tailEnd type="triangle" w="lg" len="lg"/>
           </a:ln>
@@ -14662,7 +14693,9 @@
           </a:prstGeom>
           <a:ln w="28575">
             <a:solidFill>
-              <a:schemeClr val="tx1"/>
+              <a:schemeClr val="bg1">
+                <a:lumMod val="85000"/>
+              </a:schemeClr>
             </a:solidFill>
             <a:tailEnd type="triangle" w="lg" len="lg"/>
           </a:ln>
@@ -14698,7 +14731,9 @@
           </a:prstGeom>
           <a:ln w="28575">
             <a:solidFill>
-              <a:schemeClr val="tx1"/>
+              <a:schemeClr val="bg1">
+                <a:lumMod val="85000"/>
+              </a:schemeClr>
             </a:solidFill>
             <a:tailEnd type="triangle" w="lg" len="lg"/>
           </a:ln>
@@ -14721,7 +14756,7 @@
     </p:spTree>
     <p:extLst>
       <p:ext uri="{BB962C8B-B14F-4D97-AF65-F5344CB8AC3E}">
-        <p14:creationId xmlns:p14="http://schemas.microsoft.com/office/powerpoint/2010/main" val="561626025"/>
+        <p14:creationId xmlns:p14="http://schemas.microsoft.com/office/powerpoint/2010/main" val="828951870"/>
       </p:ext>
     </p:extLst>
   </p:cSld>

</xml_diff>